<commit_message>
user CRUD but cannot logout
</commit_message>
<xml_diff>
--- a/pre-project/Wireframe & ERD.pptx
+++ b/pre-project/Wireframe & ERD.pptx
@@ -110,6 +110,11 @@
       </a:defRPr>
     </a:lvl9pPr>
   </p:defaultTextStyle>
+  <p:extLst>
+    <p:ext uri="{EFAFB233-063F-42B5-8137-9DF3F51BA10A}">
+      <p15:sldGuideLst xmlns:p15="http://schemas.microsoft.com/office/powerpoint/2012/main"/>
+    </p:ext>
+  </p:extLst>
 </p:presentation>
 </file>
 
@@ -7302,7 +7307,7 @@
             </a:pPr>
             <a:r>
               <a:rPr lang="en-SG" dirty="0"/>
-              <a:t>CRUD for Survey Title (‘/title/create’)</a:t>
+              <a:t>CRUD for Survey Title (‘/title/…’)</a:t>
             </a:r>
           </a:p>
           <a:p>
@@ -7312,7 +7317,7 @@
             </a:pPr>
             <a:r>
               <a:rPr lang="en-SG" dirty="0"/>
-              <a:t>CRUD for Survey Questions (‘/questions/create’)</a:t>
+              <a:t>CRUD for Survey Questions (‘/questions/…’)</a:t>
             </a:r>
           </a:p>
         </p:txBody>
@@ -7362,7 +7367,7 @@
         <p:spPr>
           <a:xfrm>
             <a:off x="2130458" y="3977863"/>
-            <a:ext cx="2045617" cy="2308324"/>
+            <a:ext cx="2045617" cy="2585323"/>
           </a:xfrm>
           <a:prstGeom prst="rect">
             <a:avLst/>
@@ -7456,6 +7461,17 @@
             <a:r>
               <a:rPr lang="en-SG" dirty="0" err="1"/>
               <a:t>Job_description</a:t>
+            </a:r>
+            <a:endParaRPr lang="en-SG" dirty="0"/>
+          </a:p>
+          <a:p>
+            <a:pPr marL="285750" indent="-285750">
+              <a:buFontTx/>
+              <a:buChar char="-"/>
+            </a:pPr>
+            <a:r>
+              <a:rPr lang="en-SG" dirty="0" err="1"/>
+              <a:t>Is_admin</a:t>
             </a:r>
             <a:endParaRPr lang="en-SG" dirty="0"/>
           </a:p>
@@ -7771,9 +7787,9 @@
           <p:nvPr/>
         </p:nvCxnSpPr>
         <p:spPr>
-          <a:xfrm>
+          <a:xfrm flipV="1">
             <a:off x="4176075" y="5132025"/>
-            <a:ext cx="2839038" cy="0"/>
+            <a:ext cx="2839038" cy="138500"/>
           </a:xfrm>
           <a:prstGeom prst="line">
             <a:avLst/>

</xml_diff>